<commit_message>
Cambios de la clase del viernes con comentarios
</commit_message>
<xml_diff>
--- a/Clase X - Grafos, representaciones y recorridos básicos/Clase de Grafos.pptx
+++ b/Clase X - Grafos, representaciones y recorridos básicos/Clase de Grafos.pptx
@@ -283,7 +283,7 @@
       </p15:sldGuideLst>
     </p:ext>
     <p:ext uri="http://customooxmlschemas.google.com/">
-      <go:slidesCustomData xmlns:go="http://customooxmlschemas.google.com/" xmlns:ahyp="http://schemas.microsoft.com/office/drawing/2018/hyperlinkcolor" xmlns:p15="http://schemas.microsoft.com/office/powerpoint/2012/main" xmlns:p14="http://schemas.microsoft.com/office/powerpoint/2010/main" xmlns:com="http://schemas.openxmlformats.org/drawingml/2006/compatibility" xmlns:pvml="urn:schemas-microsoft-com:office:powerpoint" xmlns:v="urn:schemas-microsoft-com:vml" xmlns:o="urn:schemas-microsoft-com:office:office" xmlns:dgm="http://schemas.openxmlformats.org/drawingml/2006/diagram" xmlns:c="http://schemas.openxmlformats.org/drawingml/2006/chart" xmlns:mv="urn:schemas-microsoft-com:mac:vml" xmlns:mc="http://schemas.openxmlformats.org/markup-compatibility/2006" xmlns="" r:id="rId46" roundtripDataSignature="AMtx7mgwgARjPC6QHRbbaRWQiZp0Tnw/pQ=="/>
+      <go:slidesCustomData xmlns="" xmlns:mc="http://schemas.openxmlformats.org/markup-compatibility/2006" xmlns:mv="urn:schemas-microsoft-com:mac:vml" xmlns:c="http://schemas.openxmlformats.org/drawingml/2006/chart" xmlns:dgm="http://schemas.openxmlformats.org/drawingml/2006/diagram" xmlns:o="urn:schemas-microsoft-com:office:office" xmlns:v="urn:schemas-microsoft-com:vml" xmlns:pvml="urn:schemas-microsoft-com:office:powerpoint" xmlns:com="http://schemas.openxmlformats.org/drawingml/2006/compatibility" xmlns:p14="http://schemas.microsoft.com/office/powerpoint/2010/main" xmlns:p15="http://schemas.microsoft.com/office/powerpoint/2012/main" xmlns:ahyp="http://schemas.microsoft.com/office/drawing/2018/hyperlinkcolor" xmlns:go="http://customooxmlschemas.google.com/" r:id="rId46" roundtripDataSignature="AMtx7mgwgARjPC6QHRbbaRWQiZp0Tnw/pQ=="/>
     </p:ext>
   </p:extLst>
 </p:presentation>
@@ -25657,10 +25657,10 @@
               <a:buNone/>
             </a:pPr>
             <a:r>
-              <a:rPr lang="es-ES" sz="2205"/>
+              <a:rPr lang="es-ES" sz="2205" dirty="0"/>
               <a:t>La operación de recorrer una estructura de datos consiste en visitar (procesar) cada uno de los nodos a partir de uno dado. Así, para recorrer un árbol se parte del nodo raíz y según el orden se visitan todos los nodos. De igual forma, recorrer un grafo consiste en visitar todos los vértices alcanzables a partir de uno dado. </a:t>
             </a:r>
-            <a:endParaRPr sz="2205"/>
+            <a:endParaRPr sz="2205" dirty="0"/>
           </a:p>
           <a:p>
             <a:pPr marL="0" lvl="0" indent="0" algn="just" rtl="0">
@@ -25676,7 +25676,7 @@
               <a:buSzPts val="1710"/>
               <a:buNone/>
             </a:pPr>
-            <a:endParaRPr sz="2205"/>
+            <a:endParaRPr sz="2205" dirty="0"/>
           </a:p>
           <a:p>
             <a:pPr marL="0" lvl="0" indent="0" algn="just" rtl="0">
@@ -25693,10 +25693,10 @@
               <a:buNone/>
             </a:pPr>
             <a:r>
-              <a:rPr lang="es-ES" sz="2205"/>
+              <a:rPr lang="es-ES" sz="2205" dirty="0"/>
               <a:t>Los recorridos de grafos se pueden realizar por:</a:t>
             </a:r>
-            <a:endParaRPr sz="2205"/>
+            <a:endParaRPr sz="2205" dirty="0"/>
           </a:p>
           <a:p>
             <a:pPr marL="914400" lvl="0" indent="-368617" algn="just" rtl="0">
@@ -25713,10 +25713,34 @@
               <a:buChar char="⚫"/>
             </a:pPr>
             <a:r>
-              <a:rPr lang="es-ES" sz="2205" b="1" i="1"/>
-              <a:t>Recorrido en Anchura (BFS - Breadth First Search)</a:t>
+              <a:rPr lang="es-ES" sz="2205" b="1" i="1" dirty="0"/>
+              <a:t>Recorrido en Anchura (BFS - </a:t>
             </a:r>
-            <a:endParaRPr sz="2205" b="1" i="1"/>
+            <a:r>
+              <a:rPr lang="es-ES" sz="2205" b="1" i="1" dirty="0" err="1"/>
+              <a:t>Breadth</a:t>
+            </a:r>
+            <a:r>
+              <a:rPr lang="es-ES" sz="2205" b="1" i="1" dirty="0"/>
+              <a:t> </a:t>
+            </a:r>
+            <a:r>
+              <a:rPr lang="es-ES" sz="2205" b="1" i="1" dirty="0" err="1"/>
+              <a:t>First</a:t>
+            </a:r>
+            <a:r>
+              <a:rPr lang="es-ES" sz="2205" b="1" i="1" dirty="0"/>
+              <a:t> </a:t>
+            </a:r>
+            <a:r>
+              <a:rPr lang="es-ES" sz="2205" b="1" i="1" dirty="0" err="1"/>
+              <a:t>Search</a:t>
+            </a:r>
+            <a:r>
+              <a:rPr lang="es-ES" sz="2205" b="1" i="1" dirty="0"/>
+              <a:t>)</a:t>
+            </a:r>
+            <a:endParaRPr sz="2205" b="1" i="1" dirty="0"/>
           </a:p>
           <a:p>
             <a:pPr marL="914400" lvl="0" indent="-368617" algn="just" rtl="0">
@@ -25733,10 +25757,26 @@
               <a:buChar char="⚫"/>
             </a:pPr>
             <a:r>
-              <a:rPr lang="es-ES" sz="2205" b="1" i="1"/>
-              <a:t>Recorrido en Profundidad (DFS - Depth First Search)</a:t>
+              <a:rPr lang="es-ES" sz="2205" b="1" i="1" dirty="0"/>
+              <a:t>Recorrido en Profundidad (DFS - Depth </a:t>
             </a:r>
-            <a:endParaRPr sz="2205" b="1"/>
+            <a:r>
+              <a:rPr lang="es-ES" sz="2205" b="1" i="1" dirty="0" err="1"/>
+              <a:t>First</a:t>
+            </a:r>
+            <a:r>
+              <a:rPr lang="es-ES" sz="2205" b="1" i="1" dirty="0"/>
+              <a:t> </a:t>
+            </a:r>
+            <a:r>
+              <a:rPr lang="es-ES" sz="2205" b="1" i="1" dirty="0" err="1"/>
+              <a:t>Search</a:t>
+            </a:r>
+            <a:r>
+              <a:rPr lang="es-ES" sz="2205" b="1" i="1" dirty="0"/>
+              <a:t>)</a:t>
+            </a:r>
+            <a:endParaRPr sz="2205" b="1" dirty="0"/>
           </a:p>
           <a:p>
             <a:pPr marL="457200" lvl="0" indent="0" algn="l" rtl="0">
@@ -25752,7 +25792,7 @@
               <a:buSzPts val="1710"/>
               <a:buNone/>
             </a:pPr>
-            <a:endParaRPr sz="1800"/>
+            <a:endParaRPr sz="1800" dirty="0"/>
           </a:p>
         </p:txBody>
       </p:sp>
@@ -32961,10 +33001,9 @@
               <a:buNone/>
             </a:pPr>
             <a:r>
-              <a:rPr lang="es-ES" sz="2000"/>
+              <a:rPr lang="es-ES" sz="2000" dirty="0"/>
               <a:t>Sea un Grafo (G), se llama:</a:t>
             </a:r>
-            <a:endParaRPr lang="es-ES" sz="2000" dirty="0"/>
           </a:p>
           <a:p>
             <a:pPr marL="0" lvl="0" indent="0" algn="just">
@@ -32983,7 +33022,7 @@
             <a:br>
               <a:rPr lang="es-ES" sz="2400" dirty="0"/>
             </a:br>
-            <a:endParaRPr sz="1100"/>
+            <a:endParaRPr sz="1100" dirty="0"/>
           </a:p>
           <a:p>
             <a:pPr marL="457200" lvl="0" indent="-381000" algn="just" rtl="0">
@@ -33248,7 +33287,7 @@
         </p:nvSpPr>
         <p:spPr>
           <a:xfrm>
-            <a:off x="457200" y="1843113"/>
+            <a:off x="216826" y="1828947"/>
             <a:ext cx="4647826" cy="4773581"/>
           </a:xfrm>
           <a:prstGeom prst="rect">
@@ -33282,10 +33321,10 @@
               <a:buChar char="❖"/>
             </a:pPr>
             <a:r>
-              <a:rPr lang="es-ES" sz="2004" b="1" i="1"/>
+              <a:rPr lang="es-ES" sz="2004" b="1" i="1" dirty="0"/>
               <a:t>Grado de un Nodo: </a:t>
             </a:r>
-            <a:endParaRPr sz="2004" b="1" i="1"/>
+            <a:endParaRPr sz="2004" b="1" i="1" dirty="0"/>
           </a:p>
           <a:p>
             <a:pPr marL="914400" lvl="1" indent="-355917" algn="just" rtl="0">
@@ -33302,10 +33341,10 @@
               <a:buChar char="➢"/>
             </a:pPr>
             <a:r>
-              <a:rPr lang="es-ES" sz="2004" i="1"/>
+              <a:rPr lang="es-ES" sz="2004" i="1" dirty="0"/>
               <a:t>A: 3</a:t>
             </a:r>
-            <a:endParaRPr sz="2004" i="1"/>
+            <a:endParaRPr sz="2004" i="1" dirty="0"/>
           </a:p>
           <a:p>
             <a:pPr marL="914400" lvl="1" indent="-355917" algn="just" rtl="0">
@@ -33322,10 +33361,10 @@
               <a:buChar char="➢"/>
             </a:pPr>
             <a:r>
-              <a:rPr lang="es-ES" sz="2004" i="1"/>
+              <a:rPr lang="es-ES" sz="2004" i="1" dirty="0"/>
               <a:t>B: 4</a:t>
             </a:r>
-            <a:endParaRPr sz="2004" i="1"/>
+            <a:endParaRPr sz="2004" i="1" dirty="0"/>
           </a:p>
           <a:p>
             <a:pPr marL="914400" lvl="1" indent="-355917" algn="just" rtl="0">
@@ -33342,10 +33381,10 @@
               <a:buChar char="➢"/>
             </a:pPr>
             <a:r>
-              <a:rPr lang="es-ES" sz="2004" i="1"/>
+              <a:rPr lang="es-ES" sz="2004" i="1" dirty="0"/>
               <a:t>D:3</a:t>
             </a:r>
-            <a:endParaRPr sz="2004" i="1"/>
+            <a:endParaRPr sz="2004" i="1" dirty="0"/>
           </a:p>
           <a:p>
             <a:pPr marL="457200" lvl="0" indent="-355917" algn="just" rtl="0">
@@ -33416,7 +33455,7 @@
               <a:t> { (F, B), (B, C), (C, A), (A, A),</a:t>
             </a:r>
             <a:br>
-              <a:rPr lang="es-ES" sz="2004" i="1"/>
+              <a:rPr lang="es-ES" sz="2004" i="1" dirty="0"/>
             </a:br>
             <a:r>
               <a:rPr lang="es-ES" sz="2004" i="1" dirty="0"/>
@@ -33442,26 +33481,26 @@
               <a:buChar char="❖"/>
             </a:pPr>
             <a:r>
-              <a:rPr lang="es-ES" sz="2004" b="1" i="1"/>
+              <a:rPr lang="es-ES" sz="2004" b="1" i="1" dirty="0"/>
               <a:t>Camino:</a:t>
             </a:r>
             <a:r>
-              <a:rPr lang="es-ES" sz="2004" i="1"/>
+              <a:rPr lang="es-ES" sz="2004" i="1" dirty="0"/>
               <a:t> </a:t>
             </a:r>
             <a:r>
-              <a:rPr lang="es-ES" sz="2004"/>
+              <a:rPr lang="es-ES" sz="2004" dirty="0"/>
               <a:t>{ </a:t>
             </a:r>
             <a:r>
-              <a:rPr lang="es-ES" sz="2004" i="1"/>
+              <a:rPr lang="es-ES" sz="2004" i="1" dirty="0"/>
               <a:t>(A, C), (C, D), (D, E)</a:t>
             </a:r>
             <a:r>
-              <a:rPr lang="es-ES" sz="2004"/>
+              <a:rPr lang="es-ES" sz="2004" dirty="0"/>
               <a:t> }</a:t>
             </a:r>
-            <a:endParaRPr sz="2004"/>
+            <a:endParaRPr sz="2004" dirty="0"/>
           </a:p>
           <a:p>
             <a:pPr marL="457200" lvl="0" indent="-355917" algn="just" rtl="0">
@@ -33531,7 +33570,56 @@
               <a:rPr lang="es-ES" sz="2004" dirty="0"/>
               <a:t>5</a:t>
             </a:r>
-            <a:endParaRPr sz="2004" dirty="0"/>
+          </a:p>
+          <a:p>
+            <a:pPr marL="457200" lvl="0" indent="-355917" algn="just" rtl="0">
+              <a:lnSpc>
+                <a:spcPct val="100000"/>
+              </a:lnSpc>
+              <a:spcBef>
+                <a:spcPts val="0"/>
+              </a:spcBef>
+              <a:spcAft>
+                <a:spcPts val="0"/>
+              </a:spcAft>
+              <a:buClr>
+                <a:srgbClr val="4A86E8"/>
+              </a:buClr>
+              <a:buSzPts val="2005"/>
+              <a:buChar char="❖"/>
+            </a:pPr>
+            <a:endParaRPr lang="es-ES" sz="2004" dirty="0"/>
+          </a:p>
+          <a:p>
+            <a:pPr marL="457200" lvl="0" indent="-355917" algn="just" rtl="0">
+              <a:lnSpc>
+                <a:spcPct val="100000"/>
+              </a:lnSpc>
+              <a:spcBef>
+                <a:spcPts val="0"/>
+              </a:spcBef>
+              <a:spcAft>
+                <a:spcPts val="0"/>
+              </a:spcAft>
+              <a:buClr>
+                <a:srgbClr val="4A86E8"/>
+              </a:buClr>
+              <a:buSzPts val="2005"/>
+              <a:buChar char="❖"/>
+            </a:pPr>
+            <a:r>
+              <a:rPr lang="es-MX" sz="2004" dirty="0">
+                <a:solidFill>
+                  <a:srgbClr val="FF0000"/>
+                </a:solidFill>
+              </a:rPr>
+              <a:t>No se puede repetir en ciclo y camino.</a:t>
+            </a:r>
+            <a:endParaRPr sz="2004" dirty="0">
+              <a:solidFill>
+                <a:srgbClr val="FF0000"/>
+              </a:solidFill>
+            </a:endParaRPr>
           </a:p>
         </p:txBody>
       </p:sp>

</xml_diff>